<commit_message>
Updated final 18/2/25 1202
</commit_message>
<xml_diff>
--- a/bk/0bk.pptx
+++ b/bk/0bk.pptx
@@ -27799,8 +27799,8 @@
         </p:nvSpPr>
         <p:spPr>
           <a:xfrm>
-            <a:off x="1077384" y="2261185"/>
-            <a:ext cx="1351652" cy="369332"/>
+            <a:off x="656103" y="3130348"/>
+            <a:ext cx="1351652" cy="646331"/>
           </a:xfrm>
           <a:prstGeom prst="rect">
             <a:avLst/>
@@ -27823,6 +27823,19 @@
                 </a:solidFill>
               </a:rPr>
               <a:t>Headcount</a:t>
+            </a:r>
+          </a:p>
+          <a:p>
+            <a:pPr algn="ctr"/>
+            <a:r>
+              <a:rPr lang="en-US" b="1" dirty="0">
+                <a:solidFill>
+                  <a:schemeClr val="bg2">
+                    <a:lumMod val="25000"/>
+                  </a:schemeClr>
+                </a:solidFill>
+              </a:rPr>
+              <a:t>(%)</a:t>
             </a:r>
           </a:p>
         </p:txBody>
@@ -29108,6 +29121,226 @@
           <a:lstStyle/>
           <a:p>
             <a:endParaRPr lang="en-US"/>
+          </a:p>
+        </p:txBody>
+      </p:sp>
+      <p:sp>
+        <p:nvSpPr>
+          <p:cNvPr id="10" name="TextBox 9">
+            <a:extLst>
+              <a:ext uri="{FF2B5EF4-FFF2-40B4-BE49-F238E27FC236}">
+                <a16:creationId xmlns:a16="http://schemas.microsoft.com/office/drawing/2014/main" id="{B98F6968-ADB5-0CB0-0FB9-9CEEE3F9348A}"/>
+              </a:ext>
+            </a:extLst>
+          </p:cNvPr>
+          <p:cNvSpPr txBox="1"/>
+          <p:nvPr/>
+        </p:nvSpPr>
+        <p:spPr>
+          <a:xfrm>
+            <a:off x="1951026" y="3130348"/>
+            <a:ext cx="1308435" cy="646331"/>
+          </a:xfrm>
+          <a:prstGeom prst="rect">
+            <a:avLst/>
+          </a:prstGeom>
+          <a:noFill/>
+        </p:spPr>
+        <p:txBody>
+          <a:bodyPr wrap="none" rtlCol="0">
+            <a:spAutoFit/>
+          </a:bodyPr>
+          <a:lstStyle/>
+          <a:p>
+            <a:pPr algn="ctr"/>
+            <a:r>
+              <a:rPr lang="en-US" b="1" dirty="0">
+                <a:solidFill>
+                  <a:schemeClr val="bg2">
+                    <a:lumMod val="25000"/>
+                  </a:schemeClr>
+                </a:solidFill>
+              </a:rPr>
+              <a:t>Avg Tenure</a:t>
+            </a:r>
+          </a:p>
+          <a:p>
+            <a:pPr algn="ctr"/>
+            <a:r>
+              <a:rPr lang="en-US" b="1" dirty="0">
+                <a:solidFill>
+                  <a:schemeClr val="bg2">
+                    <a:lumMod val="25000"/>
+                  </a:schemeClr>
+                </a:solidFill>
+              </a:rPr>
+              <a:t>(years)</a:t>
+            </a:r>
+          </a:p>
+        </p:txBody>
+      </p:sp>
+      <p:sp>
+        <p:nvSpPr>
+          <p:cNvPr id="20" name="TextBox 19">
+            <a:extLst>
+              <a:ext uri="{FF2B5EF4-FFF2-40B4-BE49-F238E27FC236}">
+                <a16:creationId xmlns:a16="http://schemas.microsoft.com/office/drawing/2014/main" id="{D93726AF-8C25-3685-4E16-39F951952C8F}"/>
+              </a:ext>
+            </a:extLst>
+          </p:cNvPr>
+          <p:cNvSpPr txBox="1"/>
+          <p:nvPr/>
+        </p:nvSpPr>
+        <p:spPr>
+          <a:xfrm>
+            <a:off x="3574489" y="3130348"/>
+            <a:ext cx="993862" cy="646331"/>
+          </a:xfrm>
+          <a:prstGeom prst="rect">
+            <a:avLst/>
+          </a:prstGeom>
+          <a:noFill/>
+        </p:spPr>
+        <p:txBody>
+          <a:bodyPr wrap="none" rtlCol="0">
+            <a:spAutoFit/>
+          </a:bodyPr>
+          <a:lstStyle/>
+          <a:p>
+            <a:pPr algn="ctr"/>
+            <a:r>
+              <a:rPr lang="en-US" b="1" dirty="0">
+                <a:solidFill>
+                  <a:schemeClr val="bg2">
+                    <a:lumMod val="25000"/>
+                  </a:schemeClr>
+                </a:solidFill>
+              </a:rPr>
+              <a:t>Avg Age</a:t>
+            </a:r>
+          </a:p>
+          <a:p>
+            <a:pPr algn="ctr"/>
+            <a:r>
+              <a:rPr lang="en-US" b="1" dirty="0">
+                <a:solidFill>
+                  <a:schemeClr val="bg2">
+                    <a:lumMod val="25000"/>
+                  </a:schemeClr>
+                </a:solidFill>
+              </a:rPr>
+              <a:t>(years)</a:t>
+            </a:r>
+          </a:p>
+        </p:txBody>
+      </p:sp>
+      <p:sp>
+        <p:nvSpPr>
+          <p:cNvPr id="21" name="TextBox 20">
+            <a:extLst>
+              <a:ext uri="{FF2B5EF4-FFF2-40B4-BE49-F238E27FC236}">
+                <a16:creationId xmlns:a16="http://schemas.microsoft.com/office/drawing/2014/main" id="{785B34CF-1D5C-B1E2-FF9A-E5F2301A80CE}"/>
+              </a:ext>
+            </a:extLst>
+          </p:cNvPr>
+          <p:cNvSpPr txBox="1"/>
+          <p:nvPr/>
+        </p:nvSpPr>
+        <p:spPr>
+          <a:xfrm>
+            <a:off x="4879337" y="3130348"/>
+            <a:ext cx="1342291" cy="646331"/>
+          </a:xfrm>
+          <a:prstGeom prst="rect">
+            <a:avLst/>
+          </a:prstGeom>
+          <a:noFill/>
+        </p:spPr>
+        <p:txBody>
+          <a:bodyPr wrap="none" rtlCol="0">
+            <a:spAutoFit/>
+          </a:bodyPr>
+          <a:lstStyle/>
+          <a:p>
+            <a:pPr algn="ctr"/>
+            <a:r>
+              <a:rPr lang="en-US" b="1" dirty="0">
+                <a:solidFill>
+                  <a:schemeClr val="bg2">
+                    <a:lumMod val="25000"/>
+                  </a:schemeClr>
+                </a:solidFill>
+              </a:rPr>
+              <a:t>Avg Annual</a:t>
+            </a:r>
+            <a:br>
+              <a:rPr lang="en-US" b="1" dirty="0">
+                <a:solidFill>
+                  <a:schemeClr val="bg2">
+                    <a:lumMod val="25000"/>
+                  </a:schemeClr>
+                </a:solidFill>
+              </a:rPr>
+            </a:br>
+            <a:r>
+              <a:rPr lang="en-US" b="1" dirty="0" err="1">
+                <a:solidFill>
+                  <a:schemeClr val="bg2">
+                    <a:lumMod val="25000"/>
+                  </a:schemeClr>
+                </a:solidFill>
+              </a:rPr>
+              <a:t>Salasry</a:t>
+            </a:r>
+            <a:endParaRPr lang="en-US" b="1" dirty="0">
+              <a:solidFill>
+                <a:schemeClr val="bg2">
+                  <a:lumMod val="25000"/>
+                </a:schemeClr>
+              </a:solidFill>
+            </a:endParaRPr>
+          </a:p>
+        </p:txBody>
+      </p:sp>
+      <p:sp>
+        <p:nvSpPr>
+          <p:cNvPr id="22" name="TextBox 21">
+            <a:extLst>
+              <a:ext uri="{FF2B5EF4-FFF2-40B4-BE49-F238E27FC236}">
+                <a16:creationId xmlns:a16="http://schemas.microsoft.com/office/drawing/2014/main" id="{78C67FEE-50E5-A259-6EFE-071013DC4487}"/>
+              </a:ext>
+            </a:extLst>
+          </p:cNvPr>
+          <p:cNvSpPr txBox="1"/>
+          <p:nvPr/>
+        </p:nvSpPr>
+        <p:spPr>
+          <a:xfrm>
+            <a:off x="1069762" y="2261735"/>
+            <a:ext cx="1351652" cy="369332"/>
+          </a:xfrm>
+          <a:prstGeom prst="rect">
+            <a:avLst/>
+          </a:prstGeom>
+          <a:noFill/>
+        </p:spPr>
+        <p:txBody>
+          <a:bodyPr wrap="none" rtlCol="0">
+            <a:spAutoFit/>
+          </a:bodyPr>
+          <a:lstStyle/>
+          <a:p>
+            <a:pPr algn="ctr"/>
+            <a:r>
+              <a:rPr lang="en-US" b="1" dirty="0">
+                <a:solidFill>
+                  <a:schemeClr val="bg2">
+                    <a:lumMod val="25000"/>
+                  </a:schemeClr>
+                </a:solidFill>
+              </a:rPr>
+              <a:t>Headcount</a:t>
+            </a:r>
           </a:p>
         </p:txBody>
       </p:sp>

</xml_diff>